<commit_message>
FHIR North presentations + updates to FHIR Intro
</commit_message>
<xml_diff>
--- a/presentations/An Introduction to HL7 FHIR.pptx
+++ b/presentations/An Introduction to HL7 FHIR.pptx
@@ -5,7 +5,7 @@
     <p:sldMasterId id="2147483684" r:id="rId1"/>
   </p:sldMasterIdLst>
   <p:notesMasterIdLst>
-    <p:notesMasterId r:id="rId16"/>
+    <p:notesMasterId r:id="rId17"/>
   </p:notesMasterIdLst>
   <p:sldIdLst>
     <p:sldId id="272" r:id="rId2"/>
@@ -21,7 +21,8 @@
     <p:sldId id="278" r:id="rId12"/>
     <p:sldId id="279" r:id="rId13"/>
     <p:sldId id="397" r:id="rId14"/>
-    <p:sldId id="398" r:id="rId15"/>
+    <p:sldId id="401" r:id="rId15"/>
+    <p:sldId id="398" r:id="rId16"/>
   </p:sldIdLst>
   <p:sldSz cx="12192000" cy="6858000"/>
   <p:notesSz cx="6858000" cy="9144000"/>
@@ -11191,7 +11192,7 @@
           <a:p>
             <a:fld id="{71BD4573-58E7-4156-A133-2731F5F8D1A6}" type="datetimeFigureOut">
               <a:rPr lang="en-US" smtClean="0"/>
-              <a:t>4/14/2018</a:t>
+              <a:t>4/19/2018</a:t>
             </a:fld>
             <a:endParaRPr lang="en-US"/>
           </a:p>
@@ -12113,7 +12114,7 @@
           <a:p>
             <a:fld id="{290457BA-669A-4F64-AFB9-CCC1D2256594}" type="datetime1">
               <a:rPr lang="en-US" smtClean="0"/>
-              <a:t>4/16/2018</a:t>
+              <a:t>4/19/2018</a:t>
             </a:fld>
             <a:endParaRPr lang="en-US" dirty="0"/>
           </a:p>
@@ -12713,7 +12714,7 @@
           <a:p>
             <a:fld id="{CBEB8760-B1AE-42AA-BFE2-7FD2D2493C0F}" type="datetime1">
               <a:rPr lang="en-US" smtClean="0"/>
-              <a:t>4/16/2018</a:t>
+              <a:t>4/19/2018</a:t>
             </a:fld>
             <a:endParaRPr lang="en-US" dirty="0"/>
           </a:p>
@@ -13016,7 +13017,7 @@
           <a:p>
             <a:fld id="{81E528F4-2D5C-4F8E-9D95-4024E5702E39}" type="datetime1">
               <a:rPr lang="en-US" smtClean="0"/>
-              <a:t>4/16/2018</a:t>
+              <a:t>4/19/2018</a:t>
             </a:fld>
             <a:endParaRPr lang="en-US" dirty="0"/>
           </a:p>
@@ -13282,7 +13283,7 @@
           <a:p>
             <a:fld id="{249C287C-12E4-4B19-993E-EA7516C439B1}" type="datetime1">
               <a:rPr lang="en-US" smtClean="0"/>
-              <a:t>4/16/2018</a:t>
+              <a:t>4/19/2018</a:t>
             </a:fld>
             <a:endParaRPr lang="en-US" dirty="0"/>
           </a:p>
@@ -13560,7 +13561,7 @@
           <a:p>
             <a:fld id="{4FB6E647-693C-4BA5-AA23-36CB5DB80B9B}" type="datetime1">
               <a:rPr lang="en-US" smtClean="0"/>
-              <a:t>4/16/2018</a:t>
+              <a:t>4/19/2018</a:t>
             </a:fld>
             <a:endParaRPr lang="en-US" dirty="0"/>
           </a:p>
@@ -13879,7 +13880,7 @@
           <a:p>
             <a:fld id="{35E5BFF8-1B56-4126-9B31-3D79421E12BC}" type="datetime1">
               <a:rPr lang="en-US" smtClean="0"/>
-              <a:t>4/16/2018</a:t>
+              <a:t>4/19/2018</a:t>
             </a:fld>
             <a:endParaRPr lang="en-US" dirty="0"/>
           </a:p>
@@ -14240,7 +14241,7 @@
           <a:p>
             <a:fld id="{F73F3D21-73E1-4B38-A5BC-E3573769A7A8}" type="datetime1">
               <a:rPr lang="en-US" smtClean="0"/>
-              <a:t>4/16/2018</a:t>
+              <a:t>4/19/2018</a:t>
             </a:fld>
             <a:endParaRPr lang="en-US" dirty="0"/>
           </a:p>
@@ -14798,7 +14799,7 @@
           <a:p>
             <a:fld id="{7B9ACB24-6AA0-4EBB-B5BC-CA3C262C02FA}" type="datetime1">
               <a:rPr lang="en-US" smtClean="0"/>
-              <a:t>4/16/2018</a:t>
+              <a:t>4/19/2018</a:t>
             </a:fld>
             <a:endParaRPr lang="en-US" dirty="0"/>
           </a:p>
@@ -14980,7 +14981,7 @@
           <a:p>
             <a:fld id="{3587C8CA-706F-41E6-B46D-BADAD7BD735F}" type="datetime1">
               <a:rPr lang="en-US" smtClean="0"/>
-              <a:t>4/16/2018</a:t>
+              <a:t>4/19/2018</a:t>
             </a:fld>
             <a:endParaRPr lang="en-US" dirty="0"/>
           </a:p>
@@ -15332,7 +15333,7 @@
           <a:p>
             <a:fld id="{FAD9D3F4-3AD1-4414-B99F-A3AEF977FB56}" type="datetime1">
               <a:rPr lang="en-US" smtClean="0"/>
-              <a:t>4/16/2018</a:t>
+              <a:t>4/19/2018</a:t>
             </a:fld>
             <a:endParaRPr lang="en-US" dirty="0"/>
           </a:p>
@@ -16044,7 +16045,7 @@
           <a:p>
             <a:fld id="{DABFACCE-6ADE-4B4A-B8AE-E44D5EB4CE3C}" type="datetime1">
               <a:rPr lang="en-US" smtClean="0"/>
-              <a:t>4/16/2018</a:t>
+              <a:t>4/19/2018</a:t>
             </a:fld>
             <a:endParaRPr lang="en-US" dirty="0"/>
           </a:p>
@@ -17068,7 +17069,7 @@
           <a:p>
             <a:fld id="{22B652D5-726C-4BA3-9145-5B4C6F54129F}" type="datetime1">
               <a:rPr lang="en-US" smtClean="0"/>
-              <a:t>4/16/2018</a:t>
+              <a:t>4/19/2018</a:t>
             </a:fld>
             <a:endParaRPr lang="en-US" dirty="0"/>
           </a:p>
@@ -17717,11 +17718,11 @@
   <p:clrMapOvr>
     <a:masterClrMapping/>
   </p:clrMapOvr>
-  <mc:AlternateContent xmlns:mc="http://schemas.openxmlformats.org/markup-compatibility/2006">
-    <mc:Choice xmlns:p14="http://schemas.microsoft.com/office/powerpoint/2010/main" Requires="p14">
+  <mc:AlternateContent xmlns:mc="http://schemas.openxmlformats.org/markup-compatibility/2006" xmlns:p14="http://schemas.microsoft.com/office/powerpoint/2010/main">
+    <mc:Choice Requires="p14">
       <p:transition p14:dur="0"/>
     </mc:Choice>
-    <mc:Fallback>
+    <mc:Fallback xmlns="">
       <p:transition/>
     </mc:Fallback>
   </mc:AlternateContent>
@@ -18149,11 +18150,11 @@
   <p:clrMapOvr>
     <a:masterClrMapping/>
   </p:clrMapOvr>
-  <mc:AlternateContent xmlns:mc="http://schemas.openxmlformats.org/markup-compatibility/2006">
-    <mc:Choice xmlns:p14="http://schemas.microsoft.com/office/powerpoint/2010/main" Requires="p14">
+  <mc:AlternateContent xmlns:mc="http://schemas.openxmlformats.org/markup-compatibility/2006" xmlns:p14="http://schemas.microsoft.com/office/powerpoint/2010/main">
+    <mc:Choice Requires="p14">
       <p:transition p14:dur="0"/>
     </mc:Choice>
-    <mc:Fallback>
+    <mc:Fallback xmlns="">
       <p:transition/>
     </mc:Fallback>
   </mc:AlternateContent>
@@ -18554,11 +18555,11 @@
   <p:clrMapOvr>
     <a:masterClrMapping/>
   </p:clrMapOvr>
-  <mc:AlternateContent xmlns:mc="http://schemas.openxmlformats.org/markup-compatibility/2006">
-    <mc:Choice xmlns:p14="http://schemas.microsoft.com/office/powerpoint/2010/main" Requires="p14">
+  <mc:AlternateContent xmlns:mc="http://schemas.openxmlformats.org/markup-compatibility/2006" xmlns:p14="http://schemas.microsoft.com/office/powerpoint/2010/main">
+    <mc:Choice Requires="p14">
       <p:transition p14:dur="0"/>
     </mc:Choice>
-    <mc:Fallback>
+    <mc:Fallback xmlns="">
       <p:transition/>
     </mc:Fallback>
   </mc:AlternateContent>
@@ -18959,11 +18960,11 @@
   <p:clrMapOvr>
     <a:masterClrMapping/>
   </p:clrMapOvr>
-  <mc:AlternateContent xmlns:mc="http://schemas.openxmlformats.org/markup-compatibility/2006">
-    <mc:Choice xmlns:p14="http://schemas.microsoft.com/office/powerpoint/2010/main" Requires="p14">
+  <mc:AlternateContent xmlns:mc="http://schemas.openxmlformats.org/markup-compatibility/2006" xmlns:p14="http://schemas.microsoft.com/office/powerpoint/2010/main">
+    <mc:Choice Requires="p14">
       <p:transition p14:dur="0"/>
     </mc:Choice>
-    <mc:Fallback>
+    <mc:Fallback xmlns="">
       <p:transition/>
     </mc:Fallback>
   </mc:AlternateContent>
@@ -19243,13 +19244,13 @@
   <p:clrMapOvr>
     <a:masterClrMapping/>
   </p:clrMapOvr>
-  <mc:AlternateContent xmlns:mc="http://schemas.openxmlformats.org/markup-compatibility/2006">
-    <mc:Choice xmlns:p159="http://schemas.microsoft.com/office/powerpoint/2015/09/main" Requires="p159">
+  <mc:AlternateContent xmlns:mc="http://schemas.openxmlformats.org/markup-compatibility/2006" xmlns:p159="http://schemas.microsoft.com/office/powerpoint/2015/09/main">
+    <mc:Choice Requires="p159">
       <p:transition xmlns:p14="http://schemas.microsoft.com/office/powerpoint/2010/main" spd="slow" p14:dur="2000">
         <p159:morph option="byObject"/>
       </p:transition>
     </mc:Choice>
-    <mc:Fallback>
+    <mc:Fallback xmlns="">
       <p:transition spd="slow">
         <p:fade/>
       </p:transition>
@@ -19259,6 +19260,514 @@
 </file>
 
 <file path=ppt/slides/slide14.xml><?xml version="1.0" encoding="utf-8"?>
+<p:sld xmlns:a="http://schemas.openxmlformats.org/drawingml/2006/main" xmlns:r="http://schemas.openxmlformats.org/officeDocument/2006/relationships" xmlns:p="http://schemas.openxmlformats.org/presentationml/2006/main">
+  <p:cSld>
+    <p:spTree>
+      <p:nvGrpSpPr>
+        <p:cNvPr id="1" name=""/>
+        <p:cNvGrpSpPr/>
+        <p:nvPr/>
+      </p:nvGrpSpPr>
+      <p:grpSpPr>
+        <a:xfrm>
+          <a:off x="0" y="0"/>
+          <a:ext cx="0" cy="0"/>
+          <a:chOff x="0" y="0"/>
+          <a:chExt cx="0" cy="0"/>
+        </a:xfrm>
+      </p:grpSpPr>
+      <p:sp>
+        <p:nvSpPr>
+          <p:cNvPr id="3" name="Title 2"/>
+          <p:cNvSpPr>
+            <a:spLocks noGrp="1"/>
+          </p:cNvSpPr>
+          <p:nvPr>
+            <p:ph type="title"/>
+          </p:nvPr>
+        </p:nvSpPr>
+        <p:spPr/>
+        <p:txBody>
+          <a:bodyPr/>
+          <a:lstStyle/>
+          <a:p>
+            <a:r>
+              <a:rPr lang="en-US" dirty="0"/>
+              <a:t>Summary</a:t>
+            </a:r>
+          </a:p>
+        </p:txBody>
+      </p:sp>
+      <p:sp>
+        <p:nvSpPr>
+          <p:cNvPr id="2" name="Content Placeholder 1"/>
+          <p:cNvSpPr>
+            <a:spLocks noGrp="1"/>
+          </p:cNvSpPr>
+          <p:nvPr>
+            <p:ph sz="half" idx="1"/>
+          </p:nvPr>
+        </p:nvSpPr>
+        <p:spPr/>
+        <p:txBody>
+          <a:bodyPr>
+            <a:normAutofit/>
+          </a:bodyPr>
+          <a:lstStyle/>
+          <a:p>
+            <a:r>
+              <a:rPr lang="en-CA"/>
+              <a:t>Standard to share healthcare data</a:t>
+            </a:r>
+          </a:p>
+          <a:p>
+            <a:endParaRPr lang="en-CA" dirty="0"/>
+          </a:p>
+        </p:txBody>
+      </p:sp>
+      <p:sp>
+        <p:nvSpPr>
+          <p:cNvPr id="4" name="Content Placeholder 3">
+            <a:extLst>
+              <a:ext uri="{FF2B5EF4-FFF2-40B4-BE49-F238E27FC236}">
+                <a16:creationId xmlns:a16="http://schemas.microsoft.com/office/drawing/2014/main" id="{6972FF14-3E07-411B-9C76-89B468B9B0DA}"/>
+              </a:ext>
+            </a:extLst>
+          </p:cNvPr>
+          <p:cNvSpPr>
+            <a:spLocks noGrp="1"/>
+          </p:cNvSpPr>
+          <p:nvPr>
+            <p:ph sz="half" idx="2"/>
+          </p:nvPr>
+        </p:nvSpPr>
+        <p:spPr/>
+        <p:txBody>
+          <a:bodyPr>
+            <a:normAutofit/>
+          </a:bodyPr>
+          <a:lstStyle/>
+          <a:p>
+            <a:r>
+              <a:rPr lang="en-CA" dirty="0"/>
+              <a:t>Enables improved adoption &amp; consistent implementation</a:t>
+            </a:r>
+          </a:p>
+          <a:p>
+            <a:pPr lvl="1"/>
+            <a:r>
+              <a:rPr lang="en-CA" dirty="0"/>
+              <a:t>Designed for implementers</a:t>
+            </a:r>
+          </a:p>
+          <a:p>
+            <a:pPr lvl="1"/>
+            <a:r>
+              <a:rPr lang="en-CA" dirty="0"/>
+              <a:t>Simple but extensible</a:t>
+            </a:r>
+          </a:p>
+          <a:p>
+            <a:pPr lvl="1"/>
+            <a:r>
+              <a:rPr lang="en-CA" dirty="0"/>
+              <a:t>Modern technology</a:t>
+            </a:r>
+          </a:p>
+          <a:p>
+            <a:pPr lvl="1"/>
+            <a:r>
+              <a:rPr lang="en-CA" dirty="0"/>
+              <a:t>Strong community</a:t>
+            </a:r>
+          </a:p>
+          <a:p>
+            <a:pPr marL="0" indent="0">
+              <a:buNone/>
+            </a:pPr>
+            <a:endParaRPr lang="en-CA" dirty="0"/>
+          </a:p>
+          <a:p>
+            <a:pPr marL="0" indent="0">
+              <a:buNone/>
+            </a:pPr>
+            <a:r>
+              <a:rPr lang="en-CA" dirty="0"/>
+              <a:t>Enables better &amp; more efficient healthcare</a:t>
+            </a:r>
+          </a:p>
+        </p:txBody>
+      </p:sp>
+      <p:sp>
+        <p:nvSpPr>
+          <p:cNvPr id="5" name="Footer Placeholder 4">
+            <a:extLst>
+              <a:ext uri="{FF2B5EF4-FFF2-40B4-BE49-F238E27FC236}">
+                <a16:creationId xmlns:a16="http://schemas.microsoft.com/office/drawing/2014/main" id="{81EE1681-779E-47B9-A1A2-6A850D747A49}"/>
+              </a:ext>
+            </a:extLst>
+          </p:cNvPr>
+          <p:cNvSpPr>
+            <a:spLocks noGrp="1"/>
+          </p:cNvSpPr>
+          <p:nvPr>
+            <p:ph type="ftr" sz="quarter" idx="3"/>
+          </p:nvPr>
+        </p:nvSpPr>
+        <p:spPr>
+          <a:xfrm>
+            <a:off x="2825361" y="6356351"/>
+            <a:ext cx="8385564" cy="365125"/>
+          </a:xfrm>
+        </p:spPr>
+        <p:txBody>
+          <a:bodyPr/>
+          <a:lstStyle/>
+          <a:p>
+            <a:r>
+              <a:rPr lang="en-CA"/>
+              <a:t>(c) 2018 HL7 ® Int’l.  HL7, Health Level Seven, FHIR, &amp; FHIR Logo are registered trademarks of HL7 International.</a:t>
+            </a:r>
+            <a:endParaRPr lang="en-US" dirty="0"/>
+          </a:p>
+        </p:txBody>
+      </p:sp>
+      <p:sp>
+        <p:nvSpPr>
+          <p:cNvPr id="6" name="Slide Number Placeholder 5">
+            <a:extLst>
+              <a:ext uri="{FF2B5EF4-FFF2-40B4-BE49-F238E27FC236}">
+                <a16:creationId xmlns:a16="http://schemas.microsoft.com/office/drawing/2014/main" id="{3A250BF4-ABCE-42CE-8EB3-A95271DC28E4}"/>
+              </a:ext>
+            </a:extLst>
+          </p:cNvPr>
+          <p:cNvSpPr>
+            <a:spLocks noGrp="1"/>
+          </p:cNvSpPr>
+          <p:nvPr>
+            <p:ph type="sldNum" sz="quarter" idx="4"/>
+          </p:nvPr>
+        </p:nvSpPr>
+        <p:spPr>
+          <a:xfrm>
+            <a:off x="11296650" y="6356351"/>
+            <a:ext cx="457200" cy="365125"/>
+          </a:xfrm>
+        </p:spPr>
+        <p:txBody>
+          <a:bodyPr/>
+          <a:lstStyle/>
+          <a:p>
+            <a:fld id="{401CF334-2D5C-4859-84A6-CA7E6E43FAEB}" type="slidenum">
+              <a:rPr lang="en-US" smtClean="0"/>
+              <a:pPr/>
+              <a:t>14</a:t>
+            </a:fld>
+            <a:endParaRPr lang="en-US"/>
+          </a:p>
+        </p:txBody>
+      </p:sp>
+      <p:pic>
+        <p:nvPicPr>
+          <p:cNvPr id="13" name="Picture 12" descr="A picture containing indoor, sitting, wall&#10;&#10;Description generated with high confidence">
+            <a:extLst>
+              <a:ext uri="{FF2B5EF4-FFF2-40B4-BE49-F238E27FC236}">
+                <a16:creationId xmlns:a16="http://schemas.microsoft.com/office/drawing/2014/main" id="{D71894BF-D1DA-4E1E-B201-9C310B1E123B}"/>
+              </a:ext>
+            </a:extLst>
+          </p:cNvPr>
+          <p:cNvPicPr>
+            <a:picLocks noChangeAspect="1"/>
+          </p:cNvPicPr>
+          <p:nvPr/>
+        </p:nvPicPr>
+        <p:blipFill>
+          <a:blip r:embed="rId2" cstate="print">
+            <a:extLst>
+              <a:ext uri="{28A0092B-C50C-407E-A947-70E740481C1C}">
+                <a14:useLocalDpi xmlns:a14="http://schemas.microsoft.com/office/drawing/2010/main" val="0"/>
+              </a:ext>
+              <a:ext uri="{837473B0-CC2E-450A-ABE3-18F120FF3D39}">
+                <a1611:picAttrSrcUrl xmlns:a1611="http://schemas.microsoft.com/office/drawing/2016/11/main" r:id="rId3"/>
+              </a:ext>
+            </a:extLst>
+          </a:blip>
+          <a:stretch>
+            <a:fillRect/>
+          </a:stretch>
+        </p:blipFill>
+        <p:spPr>
+          <a:xfrm>
+            <a:off x="996299" y="4377949"/>
+            <a:ext cx="1388604" cy="1541829"/>
+          </a:xfrm>
+          <a:prstGeom prst="rect">
+            <a:avLst/>
+          </a:prstGeom>
+        </p:spPr>
+      </p:pic>
+      <p:pic>
+        <p:nvPicPr>
+          <p:cNvPr id="16" name="Picture 15" descr="A screen shot of a computer&#10;&#10;Description generated with very high confidence">
+            <a:extLst>
+              <a:ext uri="{FF2B5EF4-FFF2-40B4-BE49-F238E27FC236}">
+                <a16:creationId xmlns:a16="http://schemas.microsoft.com/office/drawing/2014/main" id="{8D752419-EFE5-49D1-A3DF-CBC9B88BA5C0}"/>
+              </a:ext>
+            </a:extLst>
+          </p:cNvPr>
+          <p:cNvPicPr>
+            <a:picLocks noChangeAspect="1"/>
+          </p:cNvPicPr>
+          <p:nvPr/>
+        </p:nvPicPr>
+        <p:blipFill>
+          <a:blip r:embed="rId4" cstate="print">
+            <a:extLst>
+              <a:ext uri="{28A0092B-C50C-407E-A947-70E740481C1C}">
+                <a14:useLocalDpi xmlns:a14="http://schemas.microsoft.com/office/drawing/2010/main" val="0"/>
+              </a:ext>
+            </a:extLst>
+          </a:blip>
+          <a:stretch>
+            <a:fillRect/>
+          </a:stretch>
+        </p:blipFill>
+        <p:spPr>
+          <a:xfrm>
+            <a:off x="3774397" y="4338603"/>
+            <a:ext cx="1187705" cy="1678735"/>
+          </a:xfrm>
+          <a:prstGeom prst="rect">
+            <a:avLst/>
+          </a:prstGeom>
+        </p:spPr>
+      </p:pic>
+      <p:pic>
+        <p:nvPicPr>
+          <p:cNvPr id="18" name="Picture 17" descr="A picture containing object&#10;&#10;Description generated with high confidence">
+            <a:extLst>
+              <a:ext uri="{FF2B5EF4-FFF2-40B4-BE49-F238E27FC236}">
+                <a16:creationId xmlns:a16="http://schemas.microsoft.com/office/drawing/2014/main" id="{B4968322-66D5-40B6-9AF1-564EFB509DF3}"/>
+              </a:ext>
+            </a:extLst>
+          </p:cNvPr>
+          <p:cNvPicPr>
+            <a:picLocks noChangeAspect="1"/>
+          </p:cNvPicPr>
+          <p:nvPr/>
+        </p:nvPicPr>
+        <p:blipFill>
+          <a:blip r:embed="rId5" cstate="print">
+            <a:extLst>
+              <a:ext uri="{28A0092B-C50C-407E-A947-70E740481C1C}">
+                <a14:useLocalDpi xmlns:a14="http://schemas.microsoft.com/office/drawing/2010/main" val="0"/>
+              </a:ext>
+            </a:extLst>
+          </a:blip>
+          <a:stretch>
+            <a:fillRect/>
+          </a:stretch>
+        </p:blipFill>
+        <p:spPr>
+          <a:xfrm>
+            <a:off x="2386140" y="2457485"/>
+            <a:ext cx="1499141" cy="1002551"/>
+          </a:xfrm>
+          <a:prstGeom prst="rect">
+            <a:avLst/>
+          </a:prstGeom>
+        </p:spPr>
+      </p:pic>
+      <p:sp>
+        <p:nvSpPr>
+          <p:cNvPr id="19" name="Arrow: Left-Right 18">
+            <a:extLst>
+              <a:ext uri="{FF2B5EF4-FFF2-40B4-BE49-F238E27FC236}">
+                <a16:creationId xmlns:a16="http://schemas.microsoft.com/office/drawing/2014/main" id="{0C6217DA-0F87-48C2-A8CA-A0752CC7D7B4}"/>
+              </a:ext>
+            </a:extLst>
+          </p:cNvPr>
+          <p:cNvSpPr/>
+          <p:nvPr/>
+        </p:nvSpPr>
+        <p:spPr>
+          <a:xfrm>
+            <a:off x="2546915" y="4933740"/>
+            <a:ext cx="1156528" cy="430249"/>
+          </a:xfrm>
+          <a:prstGeom prst="leftRightArrow">
+            <a:avLst/>
+          </a:prstGeom>
+        </p:spPr>
+        <p:style>
+          <a:lnRef idx="1">
+            <a:schemeClr val="accent3"/>
+          </a:lnRef>
+          <a:fillRef idx="2">
+            <a:schemeClr val="accent3"/>
+          </a:fillRef>
+          <a:effectRef idx="1">
+            <a:schemeClr val="accent3"/>
+          </a:effectRef>
+          <a:fontRef idx="minor">
+            <a:schemeClr val="dk1"/>
+          </a:fontRef>
+        </p:style>
+        <p:txBody>
+          <a:bodyPr rtlCol="0" anchor="ctr"/>
+          <a:lstStyle/>
+          <a:p>
+            <a:pPr algn="ctr"/>
+            <a:endParaRPr lang="en-CA"/>
+          </a:p>
+        </p:txBody>
+      </p:sp>
+      <p:sp>
+        <p:nvSpPr>
+          <p:cNvPr id="20" name="Arrow: Left-Right 19">
+            <a:extLst>
+              <a:ext uri="{FF2B5EF4-FFF2-40B4-BE49-F238E27FC236}">
+                <a16:creationId xmlns:a16="http://schemas.microsoft.com/office/drawing/2014/main" id="{7646E3A2-F5A5-4C5A-9392-7614AF6D0188}"/>
+              </a:ext>
+            </a:extLst>
+          </p:cNvPr>
+          <p:cNvSpPr/>
+          <p:nvPr/>
+        </p:nvSpPr>
+        <p:spPr>
+          <a:xfrm rot="18000000">
+            <a:off x="1565787" y="3640117"/>
+            <a:ext cx="1156528" cy="430249"/>
+          </a:xfrm>
+          <a:prstGeom prst="leftRightArrow">
+            <a:avLst/>
+          </a:prstGeom>
+        </p:spPr>
+        <p:style>
+          <a:lnRef idx="1">
+            <a:schemeClr val="accent3"/>
+          </a:lnRef>
+          <a:fillRef idx="2">
+            <a:schemeClr val="accent3"/>
+          </a:fillRef>
+          <a:effectRef idx="1">
+            <a:schemeClr val="accent3"/>
+          </a:effectRef>
+          <a:fontRef idx="minor">
+            <a:schemeClr val="dk1"/>
+          </a:fontRef>
+        </p:style>
+        <p:txBody>
+          <a:bodyPr rtlCol="0" anchor="ctr"/>
+          <a:lstStyle/>
+          <a:p>
+            <a:pPr algn="ctr"/>
+            <a:endParaRPr lang="en-CA"/>
+          </a:p>
+        </p:txBody>
+      </p:sp>
+      <p:sp>
+        <p:nvSpPr>
+          <p:cNvPr id="21" name="Arrow: Left-Right 20">
+            <a:extLst>
+              <a:ext uri="{FF2B5EF4-FFF2-40B4-BE49-F238E27FC236}">
+                <a16:creationId xmlns:a16="http://schemas.microsoft.com/office/drawing/2014/main" id="{B727E957-928A-4B96-A027-6BF6AD6A3436}"/>
+              </a:ext>
+            </a:extLst>
+          </p:cNvPr>
+          <p:cNvSpPr/>
+          <p:nvPr/>
+        </p:nvSpPr>
+        <p:spPr>
+          <a:xfrm rot="3600000">
+            <a:off x="3415920" y="3652800"/>
+            <a:ext cx="1156528" cy="430249"/>
+          </a:xfrm>
+          <a:prstGeom prst="leftRightArrow">
+            <a:avLst/>
+          </a:prstGeom>
+        </p:spPr>
+        <p:style>
+          <a:lnRef idx="1">
+            <a:schemeClr val="accent3"/>
+          </a:lnRef>
+          <a:fillRef idx="2">
+            <a:schemeClr val="accent3"/>
+          </a:fillRef>
+          <a:effectRef idx="1">
+            <a:schemeClr val="accent3"/>
+          </a:effectRef>
+          <a:fontRef idx="minor">
+            <a:schemeClr val="dk1"/>
+          </a:fontRef>
+        </p:style>
+        <p:txBody>
+          <a:bodyPr rtlCol="0" anchor="ctr"/>
+          <a:lstStyle/>
+          <a:p>
+            <a:pPr algn="ctr"/>
+            <a:endParaRPr lang="en-CA"/>
+          </a:p>
+        </p:txBody>
+      </p:sp>
+      <p:pic>
+        <p:nvPicPr>
+          <p:cNvPr id="23" name="Picture 22">
+            <a:extLst>
+              <a:ext uri="{FF2B5EF4-FFF2-40B4-BE49-F238E27FC236}">
+                <a16:creationId xmlns:a16="http://schemas.microsoft.com/office/drawing/2014/main" id="{ABC2EE17-BB88-4CD9-A46E-DFCCEBAA5F79}"/>
+              </a:ext>
+            </a:extLst>
+          </p:cNvPr>
+          <p:cNvPicPr>
+            <a:picLocks noChangeAspect="1"/>
+          </p:cNvPicPr>
+          <p:nvPr/>
+        </p:nvPicPr>
+        <p:blipFill>
+          <a:blip r:embed="rId6">
+            <a:extLst>
+              <a:ext uri="{28A0092B-C50C-407E-A947-70E740481C1C}">
+                <a14:useLocalDpi xmlns:a14="http://schemas.microsoft.com/office/drawing/2010/main" val="0"/>
+              </a:ext>
+            </a:extLst>
+          </a:blip>
+          <a:stretch>
+            <a:fillRect/>
+          </a:stretch>
+        </p:blipFill>
+        <p:spPr>
+          <a:xfrm>
+            <a:off x="2655768" y="3707335"/>
+            <a:ext cx="812698" cy="812698"/>
+          </a:xfrm>
+          <a:prstGeom prst="rect">
+            <a:avLst/>
+          </a:prstGeom>
+        </p:spPr>
+      </p:pic>
+    </p:spTree>
+    <p:extLst>
+      <p:ext uri="{BB962C8B-B14F-4D97-AF65-F5344CB8AC3E}">
+        <p14:creationId xmlns:p14="http://schemas.microsoft.com/office/powerpoint/2010/main" val="1973445528"/>
+      </p:ext>
+    </p:extLst>
+  </p:cSld>
+  <p:clrMapOvr>
+    <a:masterClrMapping/>
+  </p:clrMapOvr>
+  <mc:AlternateContent xmlns:mc="http://schemas.openxmlformats.org/markup-compatibility/2006" xmlns:p14="http://schemas.microsoft.com/office/powerpoint/2010/main">
+    <mc:Choice Requires="p14">
+      <p:transition p14:dur="0"/>
+    </mc:Choice>
+    <mc:Fallback xmlns="">
+      <p:transition/>
+    </mc:Fallback>
+  </mc:AlternateContent>
+</p:sld>
+</file>
+
+<file path=ppt/slides/slide15.xml><?xml version="1.0" encoding="utf-8"?>
 <p:sld xmlns:a="http://schemas.openxmlformats.org/drawingml/2006/main" xmlns:r="http://schemas.openxmlformats.org/officeDocument/2006/relationships" xmlns:p="http://schemas.openxmlformats.org/presentationml/2006/main">
   <p:cSld>
     <p:spTree>
@@ -19508,7 +20017,7 @@
           <a:p>
             <a:fld id="{401CF334-2D5C-4859-84A6-CA7E6E43FAEB}" type="slidenum">
               <a:rPr lang="en-US" smtClean="0"/>
-              <a:t>14</a:t>
+              <a:t>15</a:t>
             </a:fld>
             <a:endParaRPr lang="en-US"/>
           </a:p>
@@ -19657,16 +20166,12 @@
   <p:clrMapOvr>
     <a:masterClrMapping/>
   </p:clrMapOvr>
-  <mc:AlternateContent xmlns:mc="http://schemas.openxmlformats.org/markup-compatibility/2006" xmlns:p14="http://schemas.microsoft.com/office/powerpoint/2010/main">
-    <mc:Choice Requires="p14">
-      <p:transition spd="med" p14:dur="700">
-        <p:fade/>
-      </p:transition>
+  <mc:AlternateContent xmlns:mc="http://schemas.openxmlformats.org/markup-compatibility/2006">
+    <mc:Choice xmlns:p14="http://schemas.microsoft.com/office/powerpoint/2010/main" Requires="p14">
+      <p:transition p14:dur="0"/>
     </mc:Choice>
-    <mc:Fallback xmlns="">
-      <p:transition spd="med">
-        <p:fade/>
-      </p:transition>
+    <mc:Fallback>
+      <p:transition/>
     </mc:Fallback>
   </mc:AlternateContent>
 </p:sld>
@@ -20174,11 +20679,11 @@
   <p:clrMapOvr>
     <a:masterClrMapping/>
   </p:clrMapOvr>
-  <mc:AlternateContent xmlns:mc="http://schemas.openxmlformats.org/markup-compatibility/2006">
-    <mc:Choice xmlns:p14="http://schemas.microsoft.com/office/powerpoint/2010/main" Requires="p14">
+  <mc:AlternateContent xmlns:mc="http://schemas.openxmlformats.org/markup-compatibility/2006" xmlns:p14="http://schemas.microsoft.com/office/powerpoint/2010/main">
+    <mc:Choice Requires="p14">
       <p:transition p14:dur="0"/>
     </mc:Choice>
-    <mc:Fallback>
+    <mc:Fallback xmlns="">
       <p:transition/>
     </mc:Fallback>
   </mc:AlternateContent>
@@ -21124,11 +21629,11 @@
   <p:clrMapOvr>
     <a:masterClrMapping/>
   </p:clrMapOvr>
-  <mc:AlternateContent xmlns:mc="http://schemas.openxmlformats.org/markup-compatibility/2006">
-    <mc:Choice xmlns:p14="http://schemas.microsoft.com/office/powerpoint/2010/main" Requires="p14">
+  <mc:AlternateContent xmlns:mc="http://schemas.openxmlformats.org/markup-compatibility/2006" xmlns:p14="http://schemas.microsoft.com/office/powerpoint/2010/main">
+    <mc:Choice Requires="p14">
       <p:transition p14:dur="0"/>
     </mc:Choice>
-    <mc:Fallback>
+    <mc:Fallback xmlns="">
       <p:transition/>
     </mc:Fallback>
   </mc:AlternateContent>
@@ -21153,7 +21658,7 @@
                             </p:stCondLst>
                             <p:childTnLst>
                               <p:par>
-                                <p:cTn id="5" presetID="1" presetClass="entr" presetSubtype="0" fill="hold" nodeType="clickEffect">
+                                <p:cTn id="5" presetID="10" presetClass="entr" presetSubtype="0" fill="hold" nodeType="clickEffect">
                                   <p:stCondLst>
                                     <p:cond delay="0"/>
                                   </p:stCondLst>
@@ -21176,6 +21681,14 @@
                                         <p:strVal val="visible"/>
                                       </p:to>
                                     </p:set>
+                                    <p:animEffect transition="in" filter="fade">
+                                      <p:cBhvr>
+                                        <p:cTn id="7" dur="500"/>
+                                        <p:tgtEl>
+                                          <p:spTgt spid="19"/>
+                                        </p:tgtEl>
+                                      </p:cBhvr>
+                                    </p:animEffect>
                                   </p:childTnLst>
                                 </p:cTn>
                               </p:par>
@@ -21510,11 +22023,11 @@
   <p:clrMapOvr>
     <a:masterClrMapping/>
   </p:clrMapOvr>
-  <mc:AlternateContent xmlns:mc="http://schemas.openxmlformats.org/markup-compatibility/2006">
-    <mc:Choice xmlns:p14="http://schemas.microsoft.com/office/powerpoint/2010/main" Requires="p14">
+  <mc:AlternateContent xmlns:mc="http://schemas.openxmlformats.org/markup-compatibility/2006" xmlns:p14="http://schemas.microsoft.com/office/powerpoint/2010/main">
+    <mc:Choice Requires="p14">
       <p:transition p14:dur="0"/>
     </mc:Choice>
-    <mc:Fallback>
+    <mc:Fallback xmlns="">
       <p:transition/>
     </mc:Fallback>
   </mc:AlternateContent>
@@ -22193,11 +22706,11 @@
   <p:clrMapOvr>
     <a:masterClrMapping/>
   </p:clrMapOvr>
-  <mc:AlternateContent xmlns:mc="http://schemas.openxmlformats.org/markup-compatibility/2006">
-    <mc:Choice xmlns:p14="http://schemas.microsoft.com/office/powerpoint/2010/main" Requires="p14">
+  <mc:AlternateContent xmlns:mc="http://schemas.openxmlformats.org/markup-compatibility/2006" xmlns:p14="http://schemas.microsoft.com/office/powerpoint/2010/main">
+    <mc:Choice Requires="p14">
       <p:transition p14:dur="0"/>
     </mc:Choice>
-    <mc:Fallback>
+    <mc:Fallback xmlns="">
       <p:transition/>
     </mc:Fallback>
   </mc:AlternateContent>
@@ -24671,11 +25184,11 @@
   <p:clrMapOvr>
     <a:masterClrMapping/>
   </p:clrMapOvr>
-  <mc:AlternateContent xmlns:mc="http://schemas.openxmlformats.org/markup-compatibility/2006">
-    <mc:Choice xmlns:p14="http://schemas.microsoft.com/office/powerpoint/2010/main" Requires="p14">
+  <mc:AlternateContent xmlns:mc="http://schemas.openxmlformats.org/markup-compatibility/2006" xmlns:p14="http://schemas.microsoft.com/office/powerpoint/2010/main">
+    <mc:Choice Requires="p14">
       <p:transition p14:dur="10"/>
     </mc:Choice>
-    <mc:Fallback>
+    <mc:Fallback xmlns="">
       <p:transition/>
     </mc:Fallback>
   </mc:AlternateContent>
@@ -26756,13 +27269,13 @@
   <p:clrMapOvr>
     <a:masterClrMapping/>
   </p:clrMapOvr>
-  <mc:AlternateContent xmlns:mc="http://schemas.openxmlformats.org/markup-compatibility/2006">
-    <mc:Choice xmlns:p159="http://schemas.microsoft.com/office/powerpoint/2015/09/main" Requires="p159">
+  <mc:AlternateContent xmlns:mc="http://schemas.openxmlformats.org/markup-compatibility/2006" xmlns:p159="http://schemas.microsoft.com/office/powerpoint/2015/09/main">
+    <mc:Choice Requires="p159">
       <p:transition xmlns:p14="http://schemas.microsoft.com/office/powerpoint/2010/main" spd="slow" p14:dur="2000">
         <p159:morph option="byObject"/>
       </p:transition>
     </mc:Choice>
-    <mc:Fallback>
+    <mc:Fallback xmlns="">
       <p:transition spd="slow">
         <p:fade/>
       </p:transition>
@@ -27362,11 +27875,11 @@
   <p:clrMapOvr>
     <a:masterClrMapping/>
   </p:clrMapOvr>
-  <mc:AlternateContent xmlns:mc="http://schemas.openxmlformats.org/markup-compatibility/2006">
-    <mc:Choice xmlns:p14="http://schemas.microsoft.com/office/powerpoint/2010/main" Requires="p14">
+  <mc:AlternateContent xmlns:mc="http://schemas.openxmlformats.org/markup-compatibility/2006" xmlns:p14="http://schemas.microsoft.com/office/powerpoint/2010/main">
+    <mc:Choice Requires="p14">
       <p:transition p14:dur="0"/>
     </mc:Choice>
-    <mc:Fallback>
+    <mc:Fallback xmlns="">
       <p:transition/>
     </mc:Fallback>
   </mc:AlternateContent>

</xml_diff>